<commit_message>
+ Modified slides for Day-7-1.
</commit_message>
<xml_diff>
--- a/Slides/Day_7_1.pptx
+++ b/Slides/Day_7_1.pptx
@@ -17,22 +17,23 @@
     <p:sldId id="347" r:id="rId11"/>
     <p:sldId id="349" r:id="rId12"/>
     <p:sldId id="348" r:id="rId13"/>
-    <p:sldId id="350" r:id="rId14"/>
-    <p:sldId id="351" r:id="rId15"/>
-    <p:sldId id="352" r:id="rId16"/>
-    <p:sldId id="354" r:id="rId17"/>
-    <p:sldId id="353" r:id="rId18"/>
-    <p:sldId id="355" r:id="rId19"/>
-    <p:sldId id="356" r:id="rId20"/>
-    <p:sldId id="357" r:id="rId21"/>
-    <p:sldId id="358" r:id="rId22"/>
-    <p:sldId id="359" r:id="rId23"/>
-    <p:sldId id="360" r:id="rId24"/>
-    <p:sldId id="361" r:id="rId25"/>
-    <p:sldId id="362" r:id="rId26"/>
-    <p:sldId id="363" r:id="rId27"/>
-    <p:sldId id="364" r:id="rId28"/>
-    <p:sldId id="365" r:id="rId29"/>
+    <p:sldId id="366" r:id="rId14"/>
+    <p:sldId id="350" r:id="rId15"/>
+    <p:sldId id="351" r:id="rId16"/>
+    <p:sldId id="352" r:id="rId17"/>
+    <p:sldId id="354" r:id="rId18"/>
+    <p:sldId id="353" r:id="rId19"/>
+    <p:sldId id="355" r:id="rId20"/>
+    <p:sldId id="356" r:id="rId21"/>
+    <p:sldId id="357" r:id="rId22"/>
+    <p:sldId id="358" r:id="rId23"/>
+    <p:sldId id="359" r:id="rId24"/>
+    <p:sldId id="360" r:id="rId25"/>
+    <p:sldId id="361" r:id="rId26"/>
+    <p:sldId id="362" r:id="rId27"/>
+    <p:sldId id="363" r:id="rId28"/>
+    <p:sldId id="364" r:id="rId29"/>
+    <p:sldId id="365" r:id="rId30"/>
   </p:sldIdLst>
   <p:sldSz cx="12192000" cy="6858000"/>
   <p:notesSz cx="6858000" cy="9144000"/>
@@ -325,7 +326,7 @@
           <a:p>
             <a:fld id="{EDA8BDCB-78B0-4602-A2A4-46193FA57CAD}" type="datetimeFigureOut">
               <a:rPr lang="en-US" smtClean="0"/>
-              <a:t>8/14/2024</a:t>
+              <a:t>8/15/2024</a:t>
             </a:fld>
             <a:endParaRPr lang="en-US"/>
           </a:p>
@@ -599,7 +600,7 @@
           <a:p>
             <a:fld id="{EDA8BDCB-78B0-4602-A2A4-46193FA57CAD}" type="datetimeFigureOut">
               <a:rPr lang="en-US" smtClean="0"/>
-              <a:t>8/14/2024</a:t>
+              <a:t>8/15/2024</a:t>
             </a:fld>
             <a:endParaRPr lang="en-US"/>
           </a:p>
@@ -793,7 +794,7 @@
           <a:p>
             <a:fld id="{EDA8BDCB-78B0-4602-A2A4-46193FA57CAD}" type="datetimeFigureOut">
               <a:rPr lang="en-US" smtClean="0"/>
-              <a:t>8/14/2024</a:t>
+              <a:t>8/15/2024</a:t>
             </a:fld>
             <a:endParaRPr lang="en-US"/>
           </a:p>
@@ -1066,7 +1067,7 @@
           <a:p>
             <a:fld id="{EDA8BDCB-78B0-4602-A2A4-46193FA57CAD}" type="datetimeFigureOut">
               <a:rPr lang="en-US" smtClean="0"/>
-              <a:t>8/14/2024</a:t>
+              <a:t>8/15/2024</a:t>
             </a:fld>
             <a:endParaRPr lang="en-US"/>
           </a:p>
@@ -1407,7 +1408,7 @@
           <a:p>
             <a:fld id="{EDA8BDCB-78B0-4602-A2A4-46193FA57CAD}" type="datetimeFigureOut">
               <a:rPr lang="en-US" smtClean="0"/>
-              <a:t>8/14/2024</a:t>
+              <a:t>8/15/2024</a:t>
             </a:fld>
             <a:endParaRPr lang="en-US"/>
           </a:p>
@@ -2030,7 +2031,7 @@
           <a:p>
             <a:fld id="{EDA8BDCB-78B0-4602-A2A4-46193FA57CAD}" type="datetimeFigureOut">
               <a:rPr lang="en-US" smtClean="0"/>
-              <a:t>8/14/2024</a:t>
+              <a:t>8/15/2024</a:t>
             </a:fld>
             <a:endParaRPr lang="en-US"/>
           </a:p>
@@ -2887,7 +2888,7 @@
           <a:p>
             <a:fld id="{EDA8BDCB-78B0-4602-A2A4-46193FA57CAD}" type="datetimeFigureOut">
               <a:rPr lang="en-US" smtClean="0"/>
-              <a:t>8/14/2024</a:t>
+              <a:t>8/15/2024</a:t>
             </a:fld>
             <a:endParaRPr lang="en-US"/>
           </a:p>
@@ -3057,7 +3058,7 @@
           <a:p>
             <a:fld id="{EDA8BDCB-78B0-4602-A2A4-46193FA57CAD}" type="datetimeFigureOut">
               <a:rPr lang="en-US" smtClean="0"/>
-              <a:t>8/14/2024</a:t>
+              <a:t>8/15/2024</a:t>
             </a:fld>
             <a:endParaRPr lang="en-US"/>
           </a:p>
@@ -3237,7 +3238,7 @@
           <a:p>
             <a:fld id="{EDA8BDCB-78B0-4602-A2A4-46193FA57CAD}" type="datetimeFigureOut">
               <a:rPr lang="en-US" smtClean="0"/>
-              <a:t>8/14/2024</a:t>
+              <a:t>8/15/2024</a:t>
             </a:fld>
             <a:endParaRPr lang="en-US"/>
           </a:p>
@@ -3407,7 +3408,7 @@
           <a:p>
             <a:fld id="{EDA8BDCB-78B0-4602-A2A4-46193FA57CAD}" type="datetimeFigureOut">
               <a:rPr lang="en-US" smtClean="0"/>
-              <a:t>8/14/2024</a:t>
+              <a:t>8/15/2024</a:t>
             </a:fld>
             <a:endParaRPr lang="en-US"/>
           </a:p>
@@ -3654,7 +3655,7 @@
           <a:p>
             <a:fld id="{EDA8BDCB-78B0-4602-A2A4-46193FA57CAD}" type="datetimeFigureOut">
               <a:rPr lang="en-US" smtClean="0"/>
-              <a:t>8/14/2024</a:t>
+              <a:t>8/15/2024</a:t>
             </a:fld>
             <a:endParaRPr lang="en-US"/>
           </a:p>
@@ -3946,7 +3947,7 @@
           <a:p>
             <a:fld id="{EDA8BDCB-78B0-4602-A2A4-46193FA57CAD}" type="datetimeFigureOut">
               <a:rPr lang="en-US" smtClean="0"/>
-              <a:t>8/14/2024</a:t>
+              <a:t>8/15/2024</a:t>
             </a:fld>
             <a:endParaRPr lang="en-US"/>
           </a:p>
@@ -4390,7 +4391,7 @@
           <a:p>
             <a:fld id="{EDA8BDCB-78B0-4602-A2A4-46193FA57CAD}" type="datetimeFigureOut">
               <a:rPr lang="en-US" smtClean="0"/>
-              <a:t>8/14/2024</a:t>
+              <a:t>8/15/2024</a:t>
             </a:fld>
             <a:endParaRPr lang="en-US"/>
           </a:p>
@@ -4508,7 +4509,7 @@
           <a:p>
             <a:fld id="{EDA8BDCB-78B0-4602-A2A4-46193FA57CAD}" type="datetimeFigureOut">
               <a:rPr lang="en-US" smtClean="0"/>
-              <a:t>8/14/2024</a:t>
+              <a:t>8/15/2024</a:t>
             </a:fld>
             <a:endParaRPr lang="en-US"/>
           </a:p>
@@ -4603,7 +4604,7 @@
           <a:p>
             <a:fld id="{EDA8BDCB-78B0-4602-A2A4-46193FA57CAD}" type="datetimeFigureOut">
               <a:rPr lang="en-US" smtClean="0"/>
-              <a:t>8/14/2024</a:t>
+              <a:t>8/15/2024</a:t>
             </a:fld>
             <a:endParaRPr lang="en-US"/>
           </a:p>
@@ -4882,7 +4883,7 @@
           <a:p>
             <a:fld id="{EDA8BDCB-78B0-4602-A2A4-46193FA57CAD}" type="datetimeFigureOut">
               <a:rPr lang="en-US" smtClean="0"/>
-              <a:t>8/14/2024</a:t>
+              <a:t>8/15/2024</a:t>
             </a:fld>
             <a:endParaRPr lang="en-US"/>
           </a:p>
@@ -5156,7 +5157,7 @@
           <a:p>
             <a:fld id="{EDA8BDCB-78B0-4602-A2A4-46193FA57CAD}" type="datetimeFigureOut">
               <a:rPr lang="en-US" smtClean="0"/>
-              <a:t>8/14/2024</a:t>
+              <a:t>8/15/2024</a:t>
             </a:fld>
             <a:endParaRPr lang="en-US"/>
           </a:p>
@@ -5585,7 +5586,7 @@
           <a:p>
             <a:fld id="{EDA8BDCB-78B0-4602-A2A4-46193FA57CAD}" type="datetimeFigureOut">
               <a:rPr lang="en-US" smtClean="0"/>
-              <a:t>8/14/2024</a:t>
+              <a:t>8/15/2024</a:t>
             </a:fld>
             <a:endParaRPr lang="en-US"/>
           </a:p>
@@ -6718,7 +6719,7 @@
                 <a:latin typeface="Arial" panose="020B0604020202020204" pitchFamily="34" charset="0"/>
                 <a:cs typeface="Arial" panose="020B0604020202020204" pitchFamily="34" charset="0"/>
               </a:rPr>
-              <a:t>4. Tìm hiểu về Servlet</a:t>
+              <a:t>4. Hướng dẫn khởi tạo dự án JavaEE</a:t>
             </a:r>
           </a:p>
         </p:txBody>
@@ -6741,8 +6742,8 @@
         </p:nvSpPr>
         <p:spPr>
           <a:xfrm>
-            <a:off x="1103312" y="2183907"/>
-            <a:ext cx="9549892" cy="3986074"/>
+            <a:off x="1103311" y="2183907"/>
+            <a:ext cx="9691935" cy="3986074"/>
           </a:xfrm>
         </p:spPr>
         <p:txBody>
@@ -6754,51 +6755,54 @@
                 <a:latin typeface="Arial" panose="020B0604020202020204" pitchFamily="34" charset="0"/>
                 <a:cs typeface="Arial" panose="020B0604020202020204" pitchFamily="34" charset="0"/>
               </a:rPr>
-              <a:t>4.1. Giới thiệu về Servlet</a:t>
-            </a:r>
-          </a:p>
-          <a:p>
-            <a:r>
-              <a:rPr lang="en-US">
-                <a:latin typeface="Arial" panose="020B0604020202020204" pitchFamily="34" charset="0"/>
-                <a:cs typeface="Arial" panose="020B0604020202020204" pitchFamily="34" charset="0"/>
-              </a:rPr>
-              <a:t>4.2. Lớp HttpServlet</a:t>
-            </a:r>
-          </a:p>
-          <a:p>
-            <a:r>
-              <a:rPr lang="en-US">
-                <a:latin typeface="Arial" panose="020B0604020202020204" pitchFamily="34" charset="0"/>
-                <a:cs typeface="Arial" panose="020B0604020202020204" pitchFamily="34" charset="0"/>
-              </a:rPr>
-              <a:t>4.3. Annotation @WebServlet</a:t>
-            </a:r>
-          </a:p>
-          <a:p>
-            <a:r>
-              <a:rPr lang="en-US">
-                <a:latin typeface="Arial" panose="020B0604020202020204" pitchFamily="34" charset="0"/>
-                <a:cs typeface="Arial" panose="020B0604020202020204" pitchFamily="34" charset="0"/>
-              </a:rPr>
-              <a:t>4.4. Lớp HttpServletRequest</a:t>
-            </a:r>
-          </a:p>
-          <a:p>
-            <a:r>
-              <a:rPr lang="en-US">
-                <a:latin typeface="Arial" panose="020B0604020202020204" pitchFamily="34" charset="0"/>
-                <a:cs typeface="Arial" panose="020B0604020202020204" pitchFamily="34" charset="0"/>
-              </a:rPr>
-              <a:t>4.5. Lớp HttpServletResponse</a:t>
-            </a:r>
-          </a:p>
-        </p:txBody>
-      </p:sp>
+              <a:t>Tương tự như các bước khởi tạo dự án Maven thông thường đã giới thiệu ở bài trước.</a:t>
+            </a:r>
+          </a:p>
+          <a:p>
+            <a:r>
+              <a:rPr lang="en-US">
+                <a:latin typeface="Arial" panose="020B0604020202020204" pitchFamily="34" charset="0"/>
+                <a:cs typeface="Arial" panose="020B0604020202020204" pitchFamily="34" charset="0"/>
+              </a:rPr>
+              <a:t>Chọn archtype là webapp như hình bên dưới:</a:t>
+            </a:r>
+          </a:p>
+        </p:txBody>
+      </p:sp>
+      <p:pic>
+        <p:nvPicPr>
+          <p:cNvPr id="6" name="Picture 5">
+            <a:extLst>
+              <a:ext uri="{FF2B5EF4-FFF2-40B4-BE49-F238E27FC236}">
+                <a16:creationId xmlns:a16="http://schemas.microsoft.com/office/drawing/2014/main" id="{2F687E9E-E752-4106-9B0D-43040278F6F8}"/>
+              </a:ext>
+            </a:extLst>
+          </p:cNvPr>
+          <p:cNvPicPr>
+            <a:picLocks noChangeAspect="1"/>
+          </p:cNvPicPr>
+          <p:nvPr/>
+        </p:nvPicPr>
+        <p:blipFill>
+          <a:blip r:embed="rId2"/>
+          <a:stretch>
+            <a:fillRect/>
+          </a:stretch>
+        </p:blipFill>
+        <p:spPr>
+          <a:xfrm>
+            <a:off x="1903560" y="4454374"/>
+            <a:ext cx="8384880" cy="546074"/>
+          </a:xfrm>
+          <a:prstGeom prst="rect">
+            <a:avLst/>
+          </a:prstGeom>
+        </p:spPr>
+      </p:pic>
     </p:spTree>
     <p:extLst>
       <p:ext uri="{BB962C8B-B14F-4D97-AF65-F5344CB8AC3E}">
-        <p14:creationId xmlns:p14="http://schemas.microsoft.com/office/powerpoint/2010/main" val="2550206069"/>
+        <p14:creationId xmlns:p14="http://schemas.microsoft.com/office/powerpoint/2010/main" val="1273010240"/>
       </p:ext>
     </p:extLst>
   </p:cSld>
@@ -6851,7 +6855,7 @@
                 <a:latin typeface="Arial" panose="020B0604020202020204" pitchFamily="34" charset="0"/>
                 <a:cs typeface="Arial" panose="020B0604020202020204" pitchFamily="34" charset="0"/>
               </a:rPr>
-              <a:t>4.1. Giới thiệu về Servlet</a:t>
+              <a:t>5. Tìm hiểu về Servlet</a:t>
             </a:r>
           </a:p>
         </p:txBody>
@@ -6874,8 +6878,8 @@
         </p:nvSpPr>
         <p:spPr>
           <a:xfrm>
-            <a:off x="1103311" y="2183907"/>
-            <a:ext cx="9034987" cy="3986074"/>
+            <a:off x="1103312" y="2183907"/>
+            <a:ext cx="9549892" cy="3986074"/>
           </a:xfrm>
         </p:spPr>
         <p:txBody>
@@ -6887,39 +6891,51 @@
                 <a:latin typeface="Arial" panose="020B0604020202020204" pitchFamily="34" charset="0"/>
                 <a:cs typeface="Arial" panose="020B0604020202020204" pitchFamily="34" charset="0"/>
               </a:rPr>
-              <a:t>Servlet là những lớp Java tuân theo chuẩn Servlet được đề ra bởi JavaEE.</a:t>
-            </a:r>
-          </a:p>
-          <a:p>
-            <a:r>
-              <a:rPr lang="en-US">
-                <a:latin typeface="Arial" panose="020B0604020202020204" pitchFamily="34" charset="0"/>
-                <a:cs typeface="Arial" panose="020B0604020202020204" pitchFamily="34" charset="0"/>
-              </a:rPr>
-              <a:t>Servlet là những lớp Java chuyên dùng để xử lý những yêu cầu HTTP và tạo nội dung phản hồi cho những yêu cầu đó.</a:t>
-            </a:r>
-          </a:p>
-          <a:p>
-            <a:r>
-              <a:rPr lang="en-US">
-                <a:latin typeface="Arial" panose="020B0604020202020204" pitchFamily="34" charset="0"/>
-                <a:cs typeface="Arial" panose="020B0604020202020204" pitchFamily="34" charset="0"/>
-              </a:rPr>
-              <a:t>Là những lớp sẽ được JavaEE Container gọi đến những phương thức doGet(), doPost(), ... mỗi khi nhận được yêu cầu HTTP nào đó.</a:t>
-            </a:r>
-          </a:p>
-          <a:p>
-            <a:endParaRPr lang="en-US">
-              <a:latin typeface="Arial" panose="020B0604020202020204" pitchFamily="34" charset="0"/>
-              <a:cs typeface="Arial" panose="020B0604020202020204" pitchFamily="34" charset="0"/>
-            </a:endParaRPr>
+              <a:t>5.1. Giới thiệu về Servlet</a:t>
+            </a:r>
+          </a:p>
+          <a:p>
+            <a:r>
+              <a:rPr lang="en-US">
+                <a:latin typeface="Arial" panose="020B0604020202020204" pitchFamily="34" charset="0"/>
+                <a:cs typeface="Arial" panose="020B0604020202020204" pitchFamily="34" charset="0"/>
+              </a:rPr>
+              <a:t>5.2. Lớp HttpServlet</a:t>
+            </a:r>
+          </a:p>
+          <a:p>
+            <a:r>
+              <a:rPr lang="en-US">
+                <a:latin typeface="Arial" panose="020B0604020202020204" pitchFamily="34" charset="0"/>
+                <a:cs typeface="Arial" panose="020B0604020202020204" pitchFamily="34" charset="0"/>
+              </a:rPr>
+              <a:t>5.3. Annotation @WebServlet</a:t>
+            </a:r>
+          </a:p>
+          <a:p>
+            <a:r>
+              <a:rPr lang="en-US">
+                <a:latin typeface="Arial" panose="020B0604020202020204" pitchFamily="34" charset="0"/>
+                <a:cs typeface="Arial" panose="020B0604020202020204" pitchFamily="34" charset="0"/>
+              </a:rPr>
+              <a:t>5.4. Lớp HttpServletRequest</a:t>
+            </a:r>
+          </a:p>
+          <a:p>
+            <a:r>
+              <a:rPr lang="en-US">
+                <a:latin typeface="Arial" panose="020B0604020202020204" pitchFamily="34" charset="0"/>
+                <a:cs typeface="Arial" panose="020B0604020202020204" pitchFamily="34" charset="0"/>
+              </a:rPr>
+              <a:t>5.5. Lớp HttpServletResponse</a:t>
+            </a:r>
           </a:p>
         </p:txBody>
       </p:sp>
     </p:spTree>
     <p:extLst>
       <p:ext uri="{BB962C8B-B14F-4D97-AF65-F5344CB8AC3E}">
-        <p14:creationId xmlns:p14="http://schemas.microsoft.com/office/powerpoint/2010/main" val="967425950"/>
+        <p14:creationId xmlns:p14="http://schemas.microsoft.com/office/powerpoint/2010/main" val="2550206069"/>
       </p:ext>
     </p:extLst>
   </p:cSld>
@@ -6972,7 +6988,128 @@
                 <a:latin typeface="Arial" panose="020B0604020202020204" pitchFamily="34" charset="0"/>
                 <a:cs typeface="Arial" panose="020B0604020202020204" pitchFamily="34" charset="0"/>
               </a:rPr>
-              <a:t>4.1. Giới thiệu về Servlet</a:t>
+              <a:t>5.1. Giới thiệu về Servlet</a:t>
+            </a:r>
+          </a:p>
+        </p:txBody>
+      </p:sp>
+      <p:sp>
+        <p:nvSpPr>
+          <p:cNvPr id="3" name="Content Placeholder 2">
+            <a:extLst>
+              <a:ext uri="{FF2B5EF4-FFF2-40B4-BE49-F238E27FC236}">
+                <a16:creationId xmlns:a16="http://schemas.microsoft.com/office/drawing/2014/main" id="{6337998B-3737-4D43-973D-24B118D723A2}"/>
+              </a:ext>
+            </a:extLst>
+          </p:cNvPr>
+          <p:cNvSpPr>
+            <a:spLocks noGrp="1"/>
+          </p:cNvSpPr>
+          <p:nvPr>
+            <p:ph idx="1"/>
+          </p:nvPr>
+        </p:nvSpPr>
+        <p:spPr>
+          <a:xfrm>
+            <a:off x="1103311" y="2183907"/>
+            <a:ext cx="9034987" cy="3986074"/>
+          </a:xfrm>
+        </p:spPr>
+        <p:txBody>
+          <a:bodyPr/>
+          <a:lstStyle/>
+          <a:p>
+            <a:r>
+              <a:rPr lang="en-US">
+                <a:latin typeface="Arial" panose="020B0604020202020204" pitchFamily="34" charset="0"/>
+                <a:cs typeface="Arial" panose="020B0604020202020204" pitchFamily="34" charset="0"/>
+              </a:rPr>
+              <a:t>Servlet là những lớp Java tuân theo chuẩn Servlet được đề ra bởi JavaEE.</a:t>
+            </a:r>
+          </a:p>
+          <a:p>
+            <a:r>
+              <a:rPr lang="en-US">
+                <a:latin typeface="Arial" panose="020B0604020202020204" pitchFamily="34" charset="0"/>
+                <a:cs typeface="Arial" panose="020B0604020202020204" pitchFamily="34" charset="0"/>
+              </a:rPr>
+              <a:t>Servlet là những lớp Java chuyên dùng để xử lý những yêu cầu HTTP và tạo nội dung phản hồi cho những yêu cầu đó.</a:t>
+            </a:r>
+          </a:p>
+          <a:p>
+            <a:r>
+              <a:rPr lang="en-US">
+                <a:latin typeface="Arial" panose="020B0604020202020204" pitchFamily="34" charset="0"/>
+                <a:cs typeface="Arial" panose="020B0604020202020204" pitchFamily="34" charset="0"/>
+              </a:rPr>
+              <a:t>Là những lớp sẽ được JavaEE Container gọi đến những phương thức doGet(), doPost(), ... mỗi khi nhận được yêu cầu HTTP nào đó.</a:t>
+            </a:r>
+          </a:p>
+          <a:p>
+            <a:endParaRPr lang="en-US">
+              <a:latin typeface="Arial" panose="020B0604020202020204" pitchFamily="34" charset="0"/>
+              <a:cs typeface="Arial" panose="020B0604020202020204" pitchFamily="34" charset="0"/>
+            </a:endParaRPr>
+          </a:p>
+        </p:txBody>
+      </p:sp>
+    </p:spTree>
+    <p:extLst>
+      <p:ext uri="{BB962C8B-B14F-4D97-AF65-F5344CB8AC3E}">
+        <p14:creationId xmlns:p14="http://schemas.microsoft.com/office/powerpoint/2010/main" val="967425950"/>
+      </p:ext>
+    </p:extLst>
+  </p:cSld>
+  <p:clrMapOvr>
+    <a:masterClrMapping/>
+  </p:clrMapOvr>
+</p:sld>
+</file>
+
+<file path=ppt/slides/slide16.xml><?xml version="1.0" encoding="utf-8"?>
+<p:sld xmlns:a="http://schemas.openxmlformats.org/drawingml/2006/main" xmlns:r="http://schemas.openxmlformats.org/officeDocument/2006/relationships" xmlns:p="http://schemas.openxmlformats.org/presentationml/2006/main">
+  <p:cSld>
+    <p:spTree>
+      <p:nvGrpSpPr>
+        <p:cNvPr id="1" name=""/>
+        <p:cNvGrpSpPr/>
+        <p:nvPr/>
+      </p:nvGrpSpPr>
+      <p:grpSpPr>
+        <a:xfrm>
+          <a:off x="0" y="0"/>
+          <a:ext cx="0" cy="0"/>
+          <a:chOff x="0" y="0"/>
+          <a:chExt cx="0" cy="0"/>
+        </a:xfrm>
+      </p:grpSpPr>
+      <p:sp>
+        <p:nvSpPr>
+          <p:cNvPr id="2" name="Title 1">
+            <a:extLst>
+              <a:ext uri="{FF2B5EF4-FFF2-40B4-BE49-F238E27FC236}">
+                <a16:creationId xmlns:a16="http://schemas.microsoft.com/office/drawing/2014/main" id="{14D7F595-0D8F-4FE6-A3EC-4557A1A457EB}"/>
+              </a:ext>
+            </a:extLst>
+          </p:cNvPr>
+          <p:cNvSpPr>
+            <a:spLocks noGrp="1"/>
+          </p:cNvSpPr>
+          <p:nvPr>
+            <p:ph type="title"/>
+          </p:nvPr>
+        </p:nvSpPr>
+        <p:spPr/>
+        <p:txBody>
+          <a:bodyPr/>
+          <a:lstStyle/>
+          <a:p>
+            <a:r>
+              <a:rPr lang="en-US">
+                <a:latin typeface="Arial" panose="020B0604020202020204" pitchFamily="34" charset="0"/>
+                <a:cs typeface="Arial" panose="020B0604020202020204" pitchFamily="34" charset="0"/>
+              </a:rPr>
+              <a:t>5.1. Giới thiệu về Servlet</a:t>
             </a:r>
           </a:p>
         </p:txBody>
@@ -7019,112 +7156,6 @@
 </p:sld>
 </file>
 
-<file path=ppt/slides/slide16.xml><?xml version="1.0" encoding="utf-8"?>
-<p:sld xmlns:a="http://schemas.openxmlformats.org/drawingml/2006/main" xmlns:r="http://schemas.openxmlformats.org/officeDocument/2006/relationships" xmlns:p="http://schemas.openxmlformats.org/presentationml/2006/main">
-  <p:cSld>
-    <p:spTree>
-      <p:nvGrpSpPr>
-        <p:cNvPr id="1" name=""/>
-        <p:cNvGrpSpPr/>
-        <p:nvPr/>
-      </p:nvGrpSpPr>
-      <p:grpSpPr>
-        <a:xfrm>
-          <a:off x="0" y="0"/>
-          <a:ext cx="0" cy="0"/>
-          <a:chOff x="0" y="0"/>
-          <a:chExt cx="0" cy="0"/>
-        </a:xfrm>
-      </p:grpSpPr>
-      <p:sp>
-        <p:nvSpPr>
-          <p:cNvPr id="2" name="Title 1">
-            <a:extLst>
-              <a:ext uri="{FF2B5EF4-FFF2-40B4-BE49-F238E27FC236}">
-                <a16:creationId xmlns:a16="http://schemas.microsoft.com/office/drawing/2014/main" id="{14D7F595-0D8F-4FE6-A3EC-4557A1A457EB}"/>
-              </a:ext>
-            </a:extLst>
-          </p:cNvPr>
-          <p:cNvSpPr>
-            <a:spLocks noGrp="1"/>
-          </p:cNvSpPr>
-          <p:nvPr>
-            <p:ph type="title"/>
-          </p:nvPr>
-        </p:nvSpPr>
-        <p:spPr/>
-        <p:txBody>
-          <a:bodyPr/>
-          <a:lstStyle/>
-          <a:p>
-            <a:r>
-              <a:rPr lang="en-US">
-                <a:latin typeface="Arial" panose="020B0604020202020204" pitchFamily="34" charset="0"/>
-                <a:cs typeface="Arial" panose="020B0604020202020204" pitchFamily="34" charset="0"/>
-              </a:rPr>
-              <a:t>4.2. Lớp HttpServlet</a:t>
-            </a:r>
-          </a:p>
-        </p:txBody>
-      </p:sp>
-      <p:sp>
-        <p:nvSpPr>
-          <p:cNvPr id="3" name="Content Placeholder 2">
-            <a:extLst>
-              <a:ext uri="{FF2B5EF4-FFF2-40B4-BE49-F238E27FC236}">
-                <a16:creationId xmlns:a16="http://schemas.microsoft.com/office/drawing/2014/main" id="{6337998B-3737-4D43-973D-24B118D723A2}"/>
-              </a:ext>
-            </a:extLst>
-          </p:cNvPr>
-          <p:cNvSpPr>
-            <a:spLocks noGrp="1"/>
-          </p:cNvSpPr>
-          <p:nvPr>
-            <p:ph idx="1"/>
-          </p:nvPr>
-        </p:nvSpPr>
-        <p:spPr>
-          <a:xfrm>
-            <a:off x="1103311" y="2183907"/>
-            <a:ext cx="9034987" cy="3986074"/>
-          </a:xfrm>
-        </p:spPr>
-        <p:txBody>
-          <a:bodyPr/>
-          <a:lstStyle/>
-          <a:p>
-            <a:r>
-              <a:rPr lang="en-US">
-                <a:latin typeface="Arial" panose="020B0604020202020204" pitchFamily="34" charset="0"/>
-                <a:cs typeface="Arial" panose="020B0604020202020204" pitchFamily="34" charset="0"/>
-              </a:rPr>
-              <a:t>Lớp HttpServlet là một chuẩn Servlet được thiết kê đặc biệt để xử lý những yêu cầu HTTP.</a:t>
-            </a:r>
-          </a:p>
-          <a:p>
-            <a:r>
-              <a:rPr lang="en-US">
-                <a:latin typeface="Arial" panose="020B0604020202020204" pitchFamily="34" charset="0"/>
-                <a:cs typeface="Arial" panose="020B0604020202020204" pitchFamily="34" charset="0"/>
-              </a:rPr>
-              <a:t>Chi tiết hơn, khi một yêu cầu HTTP được gửi từ phía trình duyệt web, máy chủ web sẽ chuyển tiếp yêu cầu HTTP này cho JavaEE Container và JavaEE Container sẽ gọi đến HttpServlet tương ứng để xử lý yêu cầu và tạo nội dung phản hồi.</a:t>
-            </a:r>
-          </a:p>
-        </p:txBody>
-      </p:sp>
-    </p:spTree>
-    <p:extLst>
-      <p:ext uri="{BB962C8B-B14F-4D97-AF65-F5344CB8AC3E}">
-        <p14:creationId xmlns:p14="http://schemas.microsoft.com/office/powerpoint/2010/main" val="3094888584"/>
-      </p:ext>
-    </p:extLst>
-  </p:cSld>
-  <p:clrMapOvr>
-    <a:masterClrMapping/>
-  </p:clrMapOvr>
-</p:sld>
-</file>
-
 <file path=ppt/slides/slide17.xml><?xml version="1.0" encoding="utf-8"?>
 <p:sld xmlns:a="http://schemas.openxmlformats.org/drawingml/2006/main" xmlns:r="http://schemas.openxmlformats.org/officeDocument/2006/relationships" xmlns:p="http://schemas.openxmlformats.org/presentationml/2006/main">
   <p:cSld>
@@ -7168,7 +7199,113 @@
                 <a:latin typeface="Arial" panose="020B0604020202020204" pitchFamily="34" charset="0"/>
                 <a:cs typeface="Arial" panose="020B0604020202020204" pitchFamily="34" charset="0"/>
               </a:rPr>
-              <a:t>4.2. Lớp HttpServlet</a:t>
+              <a:t>5.2. Lớp HttpServlet</a:t>
+            </a:r>
+          </a:p>
+        </p:txBody>
+      </p:sp>
+      <p:sp>
+        <p:nvSpPr>
+          <p:cNvPr id="3" name="Content Placeholder 2">
+            <a:extLst>
+              <a:ext uri="{FF2B5EF4-FFF2-40B4-BE49-F238E27FC236}">
+                <a16:creationId xmlns:a16="http://schemas.microsoft.com/office/drawing/2014/main" id="{6337998B-3737-4D43-973D-24B118D723A2}"/>
+              </a:ext>
+            </a:extLst>
+          </p:cNvPr>
+          <p:cNvSpPr>
+            <a:spLocks noGrp="1"/>
+          </p:cNvSpPr>
+          <p:nvPr>
+            <p:ph idx="1"/>
+          </p:nvPr>
+        </p:nvSpPr>
+        <p:spPr>
+          <a:xfrm>
+            <a:off x="1103311" y="2183907"/>
+            <a:ext cx="9034987" cy="3986074"/>
+          </a:xfrm>
+        </p:spPr>
+        <p:txBody>
+          <a:bodyPr/>
+          <a:lstStyle/>
+          <a:p>
+            <a:r>
+              <a:rPr lang="en-US">
+                <a:latin typeface="Arial" panose="020B0604020202020204" pitchFamily="34" charset="0"/>
+                <a:cs typeface="Arial" panose="020B0604020202020204" pitchFamily="34" charset="0"/>
+              </a:rPr>
+              <a:t>Lớp HttpServlet là một chuẩn Servlet được thiết kê đặc biệt để xử lý những yêu cầu HTTP.</a:t>
+            </a:r>
+          </a:p>
+          <a:p>
+            <a:r>
+              <a:rPr lang="en-US">
+                <a:latin typeface="Arial" panose="020B0604020202020204" pitchFamily="34" charset="0"/>
+                <a:cs typeface="Arial" panose="020B0604020202020204" pitchFamily="34" charset="0"/>
+              </a:rPr>
+              <a:t>Chi tiết hơn, khi một yêu cầu HTTP được gửi từ phía trình duyệt web, máy chủ web sẽ chuyển tiếp yêu cầu HTTP này cho JavaEE Container và JavaEE Container sẽ gọi đến HttpServlet tương ứng để xử lý yêu cầu và tạo nội dung phản hồi.</a:t>
+            </a:r>
+          </a:p>
+        </p:txBody>
+      </p:sp>
+    </p:spTree>
+    <p:extLst>
+      <p:ext uri="{BB962C8B-B14F-4D97-AF65-F5344CB8AC3E}">
+        <p14:creationId xmlns:p14="http://schemas.microsoft.com/office/powerpoint/2010/main" val="3094888584"/>
+      </p:ext>
+    </p:extLst>
+  </p:cSld>
+  <p:clrMapOvr>
+    <a:masterClrMapping/>
+  </p:clrMapOvr>
+</p:sld>
+</file>
+
+<file path=ppt/slides/slide18.xml><?xml version="1.0" encoding="utf-8"?>
+<p:sld xmlns:a="http://schemas.openxmlformats.org/drawingml/2006/main" xmlns:r="http://schemas.openxmlformats.org/officeDocument/2006/relationships" xmlns:p="http://schemas.openxmlformats.org/presentationml/2006/main">
+  <p:cSld>
+    <p:spTree>
+      <p:nvGrpSpPr>
+        <p:cNvPr id="1" name=""/>
+        <p:cNvGrpSpPr/>
+        <p:nvPr/>
+      </p:nvGrpSpPr>
+      <p:grpSpPr>
+        <a:xfrm>
+          <a:off x="0" y="0"/>
+          <a:ext cx="0" cy="0"/>
+          <a:chOff x="0" y="0"/>
+          <a:chExt cx="0" cy="0"/>
+        </a:xfrm>
+      </p:grpSpPr>
+      <p:sp>
+        <p:nvSpPr>
+          <p:cNvPr id="2" name="Title 1">
+            <a:extLst>
+              <a:ext uri="{FF2B5EF4-FFF2-40B4-BE49-F238E27FC236}">
+                <a16:creationId xmlns:a16="http://schemas.microsoft.com/office/drawing/2014/main" id="{14D7F595-0D8F-4FE6-A3EC-4557A1A457EB}"/>
+              </a:ext>
+            </a:extLst>
+          </p:cNvPr>
+          <p:cNvSpPr>
+            <a:spLocks noGrp="1"/>
+          </p:cNvSpPr>
+          <p:nvPr>
+            <p:ph type="title"/>
+          </p:nvPr>
+        </p:nvSpPr>
+        <p:spPr/>
+        <p:txBody>
+          <a:bodyPr/>
+          <a:lstStyle/>
+          <a:p>
+            <a:r>
+              <a:rPr lang="en-US">
+                <a:latin typeface="Arial" panose="020B0604020202020204" pitchFamily="34" charset="0"/>
+                <a:cs typeface="Arial" panose="020B0604020202020204" pitchFamily="34" charset="0"/>
+              </a:rPr>
+              <a:t>5.2. Lớp HttpServlet</a:t>
             </a:r>
           </a:p>
         </p:txBody>
@@ -7215,132 +7352,6 @@
 </p:sld>
 </file>
 
-<file path=ppt/slides/slide18.xml><?xml version="1.0" encoding="utf-8"?>
-<p:sld xmlns:a="http://schemas.openxmlformats.org/drawingml/2006/main" xmlns:r="http://schemas.openxmlformats.org/officeDocument/2006/relationships" xmlns:p="http://schemas.openxmlformats.org/presentationml/2006/main">
-  <p:cSld>
-    <p:spTree>
-      <p:nvGrpSpPr>
-        <p:cNvPr id="1" name=""/>
-        <p:cNvGrpSpPr/>
-        <p:nvPr/>
-      </p:nvGrpSpPr>
-      <p:grpSpPr>
-        <a:xfrm>
-          <a:off x="0" y="0"/>
-          <a:ext cx="0" cy="0"/>
-          <a:chOff x="0" y="0"/>
-          <a:chExt cx="0" cy="0"/>
-        </a:xfrm>
-      </p:grpSpPr>
-      <p:sp>
-        <p:nvSpPr>
-          <p:cNvPr id="2" name="Title 1">
-            <a:extLst>
-              <a:ext uri="{FF2B5EF4-FFF2-40B4-BE49-F238E27FC236}">
-                <a16:creationId xmlns:a16="http://schemas.microsoft.com/office/drawing/2014/main" id="{14D7F595-0D8F-4FE6-A3EC-4557A1A457EB}"/>
-              </a:ext>
-            </a:extLst>
-          </p:cNvPr>
-          <p:cNvSpPr>
-            <a:spLocks noGrp="1"/>
-          </p:cNvSpPr>
-          <p:nvPr>
-            <p:ph type="title"/>
-          </p:nvPr>
-        </p:nvSpPr>
-        <p:spPr/>
-        <p:txBody>
-          <a:bodyPr/>
-          <a:lstStyle/>
-          <a:p>
-            <a:r>
-              <a:rPr lang="en-US">
-                <a:latin typeface="Arial" panose="020B0604020202020204" pitchFamily="34" charset="0"/>
-                <a:cs typeface="Arial" panose="020B0604020202020204" pitchFamily="34" charset="0"/>
-              </a:rPr>
-              <a:t>4.3. Annotation @WebServlet</a:t>
-            </a:r>
-          </a:p>
-        </p:txBody>
-      </p:sp>
-      <p:sp>
-        <p:nvSpPr>
-          <p:cNvPr id="3" name="Content Placeholder 2">
-            <a:extLst>
-              <a:ext uri="{FF2B5EF4-FFF2-40B4-BE49-F238E27FC236}">
-                <a16:creationId xmlns:a16="http://schemas.microsoft.com/office/drawing/2014/main" id="{6337998B-3737-4D43-973D-24B118D723A2}"/>
-              </a:ext>
-            </a:extLst>
-          </p:cNvPr>
-          <p:cNvSpPr>
-            <a:spLocks noGrp="1"/>
-          </p:cNvSpPr>
-          <p:nvPr>
-            <p:ph idx="1"/>
-          </p:nvPr>
-        </p:nvSpPr>
-        <p:spPr>
-          <a:xfrm>
-            <a:off x="1103311" y="2183907"/>
-            <a:ext cx="9034987" cy="3986074"/>
-          </a:xfrm>
-        </p:spPr>
-        <p:txBody>
-          <a:bodyPr/>
-          <a:lstStyle/>
-          <a:p>
-            <a:r>
-              <a:rPr lang="en-US">
-                <a:latin typeface="Arial" panose="020B0604020202020204" pitchFamily="34" charset="0"/>
-                <a:cs typeface="Arial" panose="020B0604020202020204" pitchFamily="34" charset="0"/>
-              </a:rPr>
-              <a:t>Annotation @WebServlet được gán trước các lớp HttpServlet để chỉ định đường dẫn của lớp HttpServlet này.</a:t>
-            </a:r>
-          </a:p>
-          <a:p>
-            <a:r>
-              <a:rPr lang="en-US">
-                <a:latin typeface="Arial" panose="020B0604020202020204" pitchFamily="34" charset="0"/>
-                <a:cs typeface="Arial" panose="020B0604020202020204" pitchFamily="34" charset="0"/>
-              </a:rPr>
-              <a:t>Ví dụ:</a:t>
-            </a:r>
-          </a:p>
-          <a:p>
-            <a:pPr lvl="1"/>
-            <a:r>
-              <a:rPr lang="en-US">
-                <a:latin typeface="Arial" panose="020B0604020202020204" pitchFamily="34" charset="0"/>
-                <a:cs typeface="Arial" panose="020B0604020202020204" pitchFamily="34" charset="0"/>
-              </a:rPr>
-              <a:t>Annoation: @WebServlet("/login") được gán trước lớp LoginServlet</a:t>
-            </a:r>
-          </a:p>
-          <a:p>
-            <a:pPr lvl="1"/>
-            <a:r>
-              <a:rPr lang="en-US">
-                <a:latin typeface="Arial" panose="020B0604020202020204" pitchFamily="34" charset="0"/>
-                <a:cs typeface="Arial" panose="020B0604020202020204" pitchFamily="34" charset="0"/>
-              </a:rPr>
-              <a:t>Các yêu cầu HTTP có đường dẫn phía sau là /login (Ví dụ: http://localhost:8080/login) sẽ được xử lý bởi lớp LoginServlet.</a:t>
-            </a:r>
-          </a:p>
-        </p:txBody>
-      </p:sp>
-    </p:spTree>
-    <p:extLst>
-      <p:ext uri="{BB962C8B-B14F-4D97-AF65-F5344CB8AC3E}">
-        <p14:creationId xmlns:p14="http://schemas.microsoft.com/office/powerpoint/2010/main" val="1919184121"/>
-      </p:ext>
-    </p:extLst>
-  </p:cSld>
-  <p:clrMapOvr>
-    <a:masterClrMapping/>
-  </p:clrMapOvr>
-</p:sld>
-</file>
-
 <file path=ppt/slides/slide19.xml><?xml version="1.0" encoding="utf-8"?>
 <p:sld xmlns:a="http://schemas.openxmlformats.org/drawingml/2006/main" xmlns:r="http://schemas.openxmlformats.org/officeDocument/2006/relationships" xmlns:p="http://schemas.openxmlformats.org/presentationml/2006/main">
   <p:cSld>
@@ -7384,7 +7395,7 @@
                 <a:latin typeface="Arial" panose="020B0604020202020204" pitchFamily="34" charset="0"/>
                 <a:cs typeface="Arial" panose="020B0604020202020204" pitchFamily="34" charset="0"/>
               </a:rPr>
-              <a:t>4.4. Lớp HttpServletRequest</a:t>
+              <a:t>5.3. Annotation @WebServlet</a:t>
             </a:r>
           </a:p>
         </p:txBody>
@@ -7420,25 +7431,36 @@
                 <a:latin typeface="Arial" panose="020B0604020202020204" pitchFamily="34" charset="0"/>
                 <a:cs typeface="Arial" panose="020B0604020202020204" pitchFamily="34" charset="0"/>
               </a:rPr>
-              <a:t>Những đối tượng thuộc lớp HttpServletRequest là những đối tượng chứa thông tin của yêu cầu HTTP.</a:t>
-            </a:r>
-          </a:p>
-          <a:p>
-            <a:r>
-              <a:rPr lang="en-US">
-                <a:latin typeface="Arial" panose="020B0604020202020204" pitchFamily="34" charset="0"/>
-                <a:cs typeface="Arial" panose="020B0604020202020204" pitchFamily="34" charset="0"/>
-              </a:rPr>
-              <a:t>Những đối tượng thuộc lớp này thường được tạo ra bởi JavaEE Container và truyền vào làm đối số gọi phương thức doGet, doPost của các Servlet.</a:t>
-            </a:r>
-          </a:p>
-          <a:p>
-            <a:r>
-              <a:rPr lang="en-US">
-                <a:latin typeface="Arial" panose="020B0604020202020204" pitchFamily="34" charset="0"/>
-                <a:cs typeface="Arial" panose="020B0604020202020204" pitchFamily="34" charset="0"/>
-              </a:rPr>
-              <a:t>Những đối tượng thuộc lớp này được JavaEE Container tạo dựa trên những thông tin được cung cấp bởi yêu cầu HTTP được gửi từ phía trình duyệt web.</a:t>
+              <a:t>Annotation @WebServlet được gán trước các lớp HttpServlet để chỉ định đường dẫn của lớp HttpServlet này.</a:t>
+            </a:r>
+          </a:p>
+          <a:p>
+            <a:r>
+              <a:rPr lang="en-US">
+                <a:latin typeface="Arial" panose="020B0604020202020204" pitchFamily="34" charset="0"/>
+                <a:cs typeface="Arial" panose="020B0604020202020204" pitchFamily="34" charset="0"/>
+              </a:rPr>
+              <a:t>Ví dụ:</a:t>
+            </a:r>
+          </a:p>
+          <a:p>
+            <a:pPr lvl="1"/>
+            <a:r>
+              <a:rPr lang="en-US">
+                <a:latin typeface="Arial" panose="020B0604020202020204" pitchFamily="34" charset="0"/>
+                <a:cs typeface="Arial" panose="020B0604020202020204" pitchFamily="34" charset="0"/>
+              </a:rPr>
+              <a:t>Annoation: @WebServlet("/login") được gán trước lớp LoginServlet</a:t>
+            </a:r>
+          </a:p>
+          <a:p>
+            <a:pPr lvl="1"/>
+            <a:r>
+              <a:rPr lang="en-US">
+                <a:latin typeface="Arial" panose="020B0604020202020204" pitchFamily="34" charset="0"/>
+                <a:cs typeface="Arial" panose="020B0604020202020204" pitchFamily="34" charset="0"/>
+              </a:rPr>
+              <a:t>Các yêu cầu HTTP có đường dẫn phía sau là /login (Ví dụ: http://localhost:8080/login) sẽ được xử lý bởi lớp LoginServlet.</a:t>
             </a:r>
           </a:p>
         </p:txBody>
@@ -7446,7 +7468,7 @@
     </p:spTree>
     <p:extLst>
       <p:ext uri="{BB962C8B-B14F-4D97-AF65-F5344CB8AC3E}">
-        <p14:creationId xmlns:p14="http://schemas.microsoft.com/office/powerpoint/2010/main" val="1871336901"/>
+        <p14:creationId xmlns:p14="http://schemas.microsoft.com/office/powerpoint/2010/main" val="1919184121"/>
       </p:ext>
     </p:extLst>
   </p:cSld>
@@ -7623,7 +7645,7 @@
                 <a:latin typeface="Arial" panose="020B0604020202020204" pitchFamily="34" charset="0"/>
                 <a:cs typeface="Arial" panose="020B0604020202020204" pitchFamily="34" charset="0"/>
               </a:rPr>
-              <a:t>4.4. Lớp HttpServletRequest</a:t>
+              <a:t>5.4. Lớp HttpServletRequest</a:t>
             </a:r>
           </a:p>
         </p:txBody>
@@ -7659,47 +7681,25 @@
                 <a:latin typeface="Arial" panose="020B0604020202020204" pitchFamily="34" charset="0"/>
                 <a:cs typeface="Arial" panose="020B0604020202020204" pitchFamily="34" charset="0"/>
               </a:rPr>
-              <a:t>Những công việc chính mà các đối tượng thuộc lớp HttpServletRequest thường thực hiện:</a:t>
-            </a:r>
-          </a:p>
-          <a:p>
-            <a:pPr lvl="1"/>
-            <a:r>
-              <a:rPr lang="en-US">
-                <a:latin typeface="Arial" panose="020B0604020202020204" pitchFamily="34" charset="0"/>
-                <a:cs typeface="Arial" panose="020B0604020202020204" pitchFamily="34" charset="0"/>
-              </a:rPr>
-              <a:t>Chuyển tiếp yêu cầu: Chuyển tiếp yêu cầu từ HttpServlet này sang HttpServlet khác. (Ví dụ: từ /login đến /home)</a:t>
-            </a:r>
-          </a:p>
-          <a:p>
-            <a:pPr lvl="1"/>
-            <a:r>
-              <a:rPr lang="en-US">
-                <a:latin typeface="Arial" panose="020B0604020202020204" pitchFamily="34" charset="0"/>
-                <a:cs typeface="Arial" panose="020B0604020202020204" pitchFamily="34" charset="0"/>
-              </a:rPr>
-              <a:t>Truy xuất tham số từ yêu cầu HTTP: Khi HttpServlet xử lý yêu cầu HTTP, sẽ thường xuyên cần truy xuất tham số từ yêu cầu HTTP để xử lý gì đó.</a:t>
-            </a:r>
-          </a:p>
-          <a:p>
-            <a:pPr lvl="1"/>
-            <a:r>
-              <a:rPr lang="en-US">
-                <a:latin typeface="Arial" panose="020B0604020202020204" pitchFamily="34" charset="0"/>
-                <a:cs typeface="Arial" panose="020B0604020202020204" pitchFamily="34" charset="0"/>
-              </a:rPr>
-              <a:t>Tạo / truy xuất phiên làm việc (Session): Tạo phiên làm việc hoặc truy xuất phiên làm việc nếu đã có, để lưu trữ trạng thái của người dùng trong khoảng thời gian dài.</a:t>
-            </a:r>
-          </a:p>
-          <a:p>
-            <a:pPr lvl="1"/>
-            <a:r>
-              <a:rPr lang="en-US">
-                <a:latin typeface="Arial" panose="020B0604020202020204" pitchFamily="34" charset="0"/>
-                <a:cs typeface="Arial" panose="020B0604020202020204" pitchFamily="34" charset="0"/>
-              </a:rPr>
-              <a:t>Lưu trữ lớp đối tượng mô hình dữ liệu: Mang đến khả năng hiển thị dữ liệu hệ thống cho giao diện.</a:t>
+              <a:t>Những đối tượng thuộc lớp HttpServletRequest là những đối tượng chứa thông tin của yêu cầu HTTP.</a:t>
+            </a:r>
+          </a:p>
+          <a:p>
+            <a:r>
+              <a:rPr lang="en-US">
+                <a:latin typeface="Arial" panose="020B0604020202020204" pitchFamily="34" charset="0"/>
+                <a:cs typeface="Arial" panose="020B0604020202020204" pitchFamily="34" charset="0"/>
+              </a:rPr>
+              <a:t>Những đối tượng thuộc lớp này thường được tạo ra bởi JavaEE Container và truyền vào làm đối số gọi phương thức doGet, doPost của các Servlet.</a:t>
+            </a:r>
+          </a:p>
+          <a:p>
+            <a:r>
+              <a:rPr lang="en-US">
+                <a:latin typeface="Arial" panose="020B0604020202020204" pitchFamily="34" charset="0"/>
+                <a:cs typeface="Arial" panose="020B0604020202020204" pitchFamily="34" charset="0"/>
+              </a:rPr>
+              <a:t>Những đối tượng thuộc lớp này được JavaEE Container tạo dựa trên những thông tin được cung cấp bởi yêu cầu HTTP được gửi từ phía trình duyệt web.</a:t>
             </a:r>
           </a:p>
         </p:txBody>
@@ -7707,7 +7707,7 @@
     </p:spTree>
     <p:extLst>
       <p:ext uri="{BB962C8B-B14F-4D97-AF65-F5344CB8AC3E}">
-        <p14:creationId xmlns:p14="http://schemas.microsoft.com/office/powerpoint/2010/main" val="2934881679"/>
+        <p14:creationId xmlns:p14="http://schemas.microsoft.com/office/powerpoint/2010/main" val="1871336901"/>
       </p:ext>
     </p:extLst>
   </p:cSld>
@@ -7760,7 +7760,144 @@
                 <a:latin typeface="Arial" panose="020B0604020202020204" pitchFamily="34" charset="0"/>
                 <a:cs typeface="Arial" panose="020B0604020202020204" pitchFamily="34" charset="0"/>
               </a:rPr>
-              <a:t>4.4. Lớp HttpServletRequest</a:t>
+              <a:t>5.4. Lớp HttpServletRequest</a:t>
+            </a:r>
+          </a:p>
+        </p:txBody>
+      </p:sp>
+      <p:sp>
+        <p:nvSpPr>
+          <p:cNvPr id="3" name="Content Placeholder 2">
+            <a:extLst>
+              <a:ext uri="{FF2B5EF4-FFF2-40B4-BE49-F238E27FC236}">
+                <a16:creationId xmlns:a16="http://schemas.microsoft.com/office/drawing/2014/main" id="{6337998B-3737-4D43-973D-24B118D723A2}"/>
+              </a:ext>
+            </a:extLst>
+          </p:cNvPr>
+          <p:cNvSpPr>
+            <a:spLocks noGrp="1"/>
+          </p:cNvSpPr>
+          <p:nvPr>
+            <p:ph idx="1"/>
+          </p:nvPr>
+        </p:nvSpPr>
+        <p:spPr>
+          <a:xfrm>
+            <a:off x="1103311" y="2183907"/>
+            <a:ext cx="9034987" cy="3986074"/>
+          </a:xfrm>
+        </p:spPr>
+        <p:txBody>
+          <a:bodyPr/>
+          <a:lstStyle/>
+          <a:p>
+            <a:r>
+              <a:rPr lang="en-US">
+                <a:latin typeface="Arial" panose="020B0604020202020204" pitchFamily="34" charset="0"/>
+                <a:cs typeface="Arial" panose="020B0604020202020204" pitchFamily="34" charset="0"/>
+              </a:rPr>
+              <a:t>Những công việc chính mà các đối tượng thuộc lớp HttpServletRequest thường thực hiện:</a:t>
+            </a:r>
+          </a:p>
+          <a:p>
+            <a:pPr lvl="1"/>
+            <a:r>
+              <a:rPr lang="en-US">
+                <a:latin typeface="Arial" panose="020B0604020202020204" pitchFamily="34" charset="0"/>
+                <a:cs typeface="Arial" panose="020B0604020202020204" pitchFamily="34" charset="0"/>
+              </a:rPr>
+              <a:t>Chuyển tiếp yêu cầu: Chuyển tiếp yêu cầu từ HttpServlet này sang HttpServlet khác. (Ví dụ: từ /login đến /home)</a:t>
+            </a:r>
+          </a:p>
+          <a:p>
+            <a:pPr lvl="1"/>
+            <a:r>
+              <a:rPr lang="en-US">
+                <a:latin typeface="Arial" panose="020B0604020202020204" pitchFamily="34" charset="0"/>
+                <a:cs typeface="Arial" panose="020B0604020202020204" pitchFamily="34" charset="0"/>
+              </a:rPr>
+              <a:t>Truy xuất tham số từ yêu cầu HTTP: Khi HttpServlet xử lý yêu cầu HTTP, sẽ thường xuyên cần truy xuất tham số từ yêu cầu HTTP để xử lý gì đó.</a:t>
+            </a:r>
+          </a:p>
+          <a:p>
+            <a:pPr lvl="1"/>
+            <a:r>
+              <a:rPr lang="en-US">
+                <a:latin typeface="Arial" panose="020B0604020202020204" pitchFamily="34" charset="0"/>
+                <a:cs typeface="Arial" panose="020B0604020202020204" pitchFamily="34" charset="0"/>
+              </a:rPr>
+              <a:t>Tạo / truy xuất phiên làm việc (Session): Tạo phiên làm việc hoặc truy xuất phiên làm việc nếu đã có, để lưu trữ trạng thái của người dùng trong khoảng thời gian dài.</a:t>
+            </a:r>
+          </a:p>
+          <a:p>
+            <a:pPr lvl="1"/>
+            <a:r>
+              <a:rPr lang="en-US">
+                <a:latin typeface="Arial" panose="020B0604020202020204" pitchFamily="34" charset="0"/>
+                <a:cs typeface="Arial" panose="020B0604020202020204" pitchFamily="34" charset="0"/>
+              </a:rPr>
+              <a:t>Lưu trữ lớp đối tượng mô hình dữ liệu: Mang đến khả năng hiển thị dữ liệu hệ thống cho giao diện.</a:t>
+            </a:r>
+          </a:p>
+        </p:txBody>
+      </p:sp>
+    </p:spTree>
+    <p:extLst>
+      <p:ext uri="{BB962C8B-B14F-4D97-AF65-F5344CB8AC3E}">
+        <p14:creationId xmlns:p14="http://schemas.microsoft.com/office/powerpoint/2010/main" val="2934881679"/>
+      </p:ext>
+    </p:extLst>
+  </p:cSld>
+  <p:clrMapOvr>
+    <a:masterClrMapping/>
+  </p:clrMapOvr>
+</p:sld>
+</file>
+
+<file path=ppt/slides/slide22.xml><?xml version="1.0" encoding="utf-8"?>
+<p:sld xmlns:a="http://schemas.openxmlformats.org/drawingml/2006/main" xmlns:r="http://schemas.openxmlformats.org/officeDocument/2006/relationships" xmlns:p="http://schemas.openxmlformats.org/presentationml/2006/main">
+  <p:cSld>
+    <p:spTree>
+      <p:nvGrpSpPr>
+        <p:cNvPr id="1" name=""/>
+        <p:cNvGrpSpPr/>
+        <p:nvPr/>
+      </p:nvGrpSpPr>
+      <p:grpSpPr>
+        <a:xfrm>
+          <a:off x="0" y="0"/>
+          <a:ext cx="0" cy="0"/>
+          <a:chOff x="0" y="0"/>
+          <a:chExt cx="0" cy="0"/>
+        </a:xfrm>
+      </p:grpSpPr>
+      <p:sp>
+        <p:nvSpPr>
+          <p:cNvPr id="2" name="Title 1">
+            <a:extLst>
+              <a:ext uri="{FF2B5EF4-FFF2-40B4-BE49-F238E27FC236}">
+                <a16:creationId xmlns:a16="http://schemas.microsoft.com/office/drawing/2014/main" id="{14D7F595-0D8F-4FE6-A3EC-4557A1A457EB}"/>
+              </a:ext>
+            </a:extLst>
+          </p:cNvPr>
+          <p:cNvSpPr>
+            <a:spLocks noGrp="1"/>
+          </p:cNvSpPr>
+          <p:nvPr>
+            <p:ph type="title"/>
+          </p:nvPr>
+        </p:nvSpPr>
+        <p:spPr/>
+        <p:txBody>
+          <a:bodyPr/>
+          <a:lstStyle/>
+          <a:p>
+            <a:r>
+              <a:rPr lang="en-US">
+                <a:latin typeface="Arial" panose="020B0604020202020204" pitchFamily="34" charset="0"/>
+                <a:cs typeface="Arial" panose="020B0604020202020204" pitchFamily="34" charset="0"/>
+              </a:rPr>
+              <a:t>5.4. Lớp HttpServletRequest</a:t>
             </a:r>
           </a:p>
         </p:txBody>
@@ -7844,7 +7981,7 @@
 </p:sld>
 </file>
 
-<file path=ppt/slides/slide22.xml><?xml version="1.0" encoding="utf-8"?>
+<file path=ppt/slides/slide23.xml><?xml version="1.0" encoding="utf-8"?>
 <p:sld xmlns:a="http://schemas.openxmlformats.org/drawingml/2006/main" xmlns:r="http://schemas.openxmlformats.org/officeDocument/2006/relationships" xmlns:p="http://schemas.openxmlformats.org/presentationml/2006/main">
   <p:cSld>
     <p:spTree>
@@ -7887,7 +8024,7 @@
                 <a:latin typeface="Arial" panose="020B0604020202020204" pitchFamily="34" charset="0"/>
                 <a:cs typeface="Arial" panose="020B0604020202020204" pitchFamily="34" charset="0"/>
               </a:rPr>
-              <a:t>4.4. Lớp HttpServletRequest</a:t>
+              <a:t>5.4. Lớp HttpServletRequest</a:t>
             </a:r>
           </a:p>
         </p:txBody>
@@ -7971,7 +8108,7 @@
 </p:sld>
 </file>
 
-<file path=ppt/slides/slide23.xml><?xml version="1.0" encoding="utf-8"?>
+<file path=ppt/slides/slide24.xml><?xml version="1.0" encoding="utf-8"?>
 <p:sld xmlns:a="http://schemas.openxmlformats.org/drawingml/2006/main" xmlns:r="http://schemas.openxmlformats.org/officeDocument/2006/relationships" xmlns:p="http://schemas.openxmlformats.org/presentationml/2006/main">
   <p:cSld>
     <p:spTree>
@@ -8014,7 +8151,7 @@
                 <a:latin typeface="Arial" panose="020B0604020202020204" pitchFamily="34" charset="0"/>
                 <a:cs typeface="Arial" panose="020B0604020202020204" pitchFamily="34" charset="0"/>
               </a:rPr>
-              <a:t>4.4. Lớp HttpServletRequest</a:t>
+              <a:t>5.4. Lớp HttpServletRequest</a:t>
             </a:r>
           </a:p>
         </p:txBody>
@@ -8098,7 +8235,7 @@
 </p:sld>
 </file>
 
-<file path=ppt/slides/slide24.xml><?xml version="1.0" encoding="utf-8"?>
+<file path=ppt/slides/slide25.xml><?xml version="1.0" encoding="utf-8"?>
 <p:sld xmlns:a="http://schemas.openxmlformats.org/drawingml/2006/main" xmlns:r="http://schemas.openxmlformats.org/officeDocument/2006/relationships" xmlns:p="http://schemas.openxmlformats.org/presentationml/2006/main">
   <p:cSld>
     <p:spTree>
@@ -8141,7 +8278,7 @@
                 <a:latin typeface="Arial" panose="020B0604020202020204" pitchFamily="34" charset="0"/>
                 <a:cs typeface="Arial" panose="020B0604020202020204" pitchFamily="34" charset="0"/>
               </a:rPr>
-              <a:t>4.4. Lớp HttpServletRequest</a:t>
+              <a:t>5.4. Lớp HttpServletRequest</a:t>
             </a:r>
           </a:p>
         </p:txBody>
@@ -8225,132 +8362,6 @@
 </p:sld>
 </file>
 
-<file path=ppt/slides/slide25.xml><?xml version="1.0" encoding="utf-8"?>
-<p:sld xmlns:a="http://schemas.openxmlformats.org/drawingml/2006/main" xmlns:r="http://schemas.openxmlformats.org/officeDocument/2006/relationships" xmlns:p="http://schemas.openxmlformats.org/presentationml/2006/main">
-  <p:cSld>
-    <p:spTree>
-      <p:nvGrpSpPr>
-        <p:cNvPr id="1" name=""/>
-        <p:cNvGrpSpPr/>
-        <p:nvPr/>
-      </p:nvGrpSpPr>
-      <p:grpSpPr>
-        <a:xfrm>
-          <a:off x="0" y="0"/>
-          <a:ext cx="0" cy="0"/>
-          <a:chOff x="0" y="0"/>
-          <a:chExt cx="0" cy="0"/>
-        </a:xfrm>
-      </p:grpSpPr>
-      <p:sp>
-        <p:nvSpPr>
-          <p:cNvPr id="2" name="Title 1">
-            <a:extLst>
-              <a:ext uri="{FF2B5EF4-FFF2-40B4-BE49-F238E27FC236}">
-                <a16:creationId xmlns:a16="http://schemas.microsoft.com/office/drawing/2014/main" id="{14D7F595-0D8F-4FE6-A3EC-4557A1A457EB}"/>
-              </a:ext>
-            </a:extLst>
-          </p:cNvPr>
-          <p:cNvSpPr>
-            <a:spLocks noGrp="1"/>
-          </p:cNvSpPr>
-          <p:nvPr>
-            <p:ph type="title"/>
-          </p:nvPr>
-        </p:nvSpPr>
-        <p:spPr/>
-        <p:txBody>
-          <a:bodyPr/>
-          <a:lstStyle/>
-          <a:p>
-            <a:r>
-              <a:rPr lang="en-US">
-                <a:latin typeface="Arial" panose="020B0604020202020204" pitchFamily="34" charset="0"/>
-                <a:cs typeface="Arial" panose="020B0604020202020204" pitchFamily="34" charset="0"/>
-              </a:rPr>
-              <a:t>4.5. Lớp HttpServletResponse</a:t>
-            </a:r>
-          </a:p>
-        </p:txBody>
-      </p:sp>
-      <p:sp>
-        <p:nvSpPr>
-          <p:cNvPr id="3" name="Content Placeholder 2">
-            <a:extLst>
-              <a:ext uri="{FF2B5EF4-FFF2-40B4-BE49-F238E27FC236}">
-                <a16:creationId xmlns:a16="http://schemas.microsoft.com/office/drawing/2014/main" id="{6337998B-3737-4D43-973D-24B118D723A2}"/>
-              </a:ext>
-            </a:extLst>
-          </p:cNvPr>
-          <p:cNvSpPr>
-            <a:spLocks noGrp="1"/>
-          </p:cNvSpPr>
-          <p:nvPr>
-            <p:ph idx="1"/>
-          </p:nvPr>
-        </p:nvSpPr>
-        <p:spPr>
-          <a:xfrm>
-            <a:off x="1103311" y="2183907"/>
-            <a:ext cx="9034987" cy="3986074"/>
-          </a:xfrm>
-        </p:spPr>
-        <p:txBody>
-          <a:bodyPr/>
-          <a:lstStyle/>
-          <a:p>
-            <a:r>
-              <a:rPr lang="en-US">
-                <a:latin typeface="Arial" panose="020B0604020202020204" pitchFamily="34" charset="0"/>
-                <a:cs typeface="Arial" panose="020B0604020202020204" pitchFamily="34" charset="0"/>
-              </a:rPr>
-              <a:t>Những đối tượng thuộc lớp là những đối tượng đại diện cho nội dung phản hồi sẽ trả về cho JavaEE Container để JavaEE Container tạo phản hồi HTTP phản hồi về phía trình duyệt web.</a:t>
-            </a:r>
-          </a:p>
-          <a:p>
-            <a:r>
-              <a:rPr lang="en-US">
-                <a:latin typeface="Arial" panose="020B0604020202020204" pitchFamily="34" charset="0"/>
-                <a:cs typeface="Arial" panose="020B0604020202020204" pitchFamily="34" charset="0"/>
-              </a:rPr>
-              <a:t>Những công việc chính của HttpServletResponse:</a:t>
-            </a:r>
-          </a:p>
-          <a:p>
-            <a:pPr lvl="1"/>
-            <a:r>
-              <a:rPr lang="en-US">
-                <a:latin typeface="Arial" panose="020B0604020202020204" pitchFamily="34" charset="0"/>
-                <a:cs typeface="Arial" panose="020B0604020202020204" pitchFamily="34" charset="0"/>
-              </a:rPr>
-              <a:t>Chuyển hướng yêu cầu HTTP: Chuyển hướng xử lý yêu cầu HTTP về một địa chỉ khác. (Ví dụ: Chuyển hướng từ /login =&gt; /home)</a:t>
-            </a:r>
-          </a:p>
-          <a:p>
-            <a:pPr lvl="1"/>
-            <a:r>
-              <a:rPr lang="en-US">
-                <a:latin typeface="Arial" panose="020B0604020202020204" pitchFamily="34" charset="0"/>
-                <a:cs typeface="Arial" panose="020B0604020202020204" pitchFamily="34" charset="0"/>
-              </a:rPr>
-              <a:t>Tạo nội dung phản hồi: Tạo nội dung phản hồi để JavaEE Container tạo phản hồi HTTP và phản hồi về phía trình duyệt web.</a:t>
-            </a:r>
-          </a:p>
-        </p:txBody>
-      </p:sp>
-    </p:spTree>
-    <p:extLst>
-      <p:ext uri="{BB962C8B-B14F-4D97-AF65-F5344CB8AC3E}">
-        <p14:creationId xmlns:p14="http://schemas.microsoft.com/office/powerpoint/2010/main" val="2173641689"/>
-      </p:ext>
-    </p:extLst>
-  </p:cSld>
-  <p:clrMapOvr>
-    <a:masterClrMapping/>
-  </p:clrMapOvr>
-</p:sld>
-</file>
-
 <file path=ppt/slides/slide26.xml><?xml version="1.0" encoding="utf-8"?>
 <p:sld xmlns:a="http://schemas.openxmlformats.org/drawingml/2006/main" xmlns:r="http://schemas.openxmlformats.org/officeDocument/2006/relationships" xmlns:p="http://schemas.openxmlformats.org/presentationml/2006/main">
   <p:cSld>
@@ -8394,7 +8405,133 @@
                 <a:latin typeface="Arial" panose="020B0604020202020204" pitchFamily="34" charset="0"/>
                 <a:cs typeface="Arial" panose="020B0604020202020204" pitchFamily="34" charset="0"/>
               </a:rPr>
-              <a:t>4.5. Lớp HttpServletResponse</a:t>
+              <a:t>5.5. Lớp HttpServletResponse</a:t>
+            </a:r>
+          </a:p>
+        </p:txBody>
+      </p:sp>
+      <p:sp>
+        <p:nvSpPr>
+          <p:cNvPr id="3" name="Content Placeholder 2">
+            <a:extLst>
+              <a:ext uri="{FF2B5EF4-FFF2-40B4-BE49-F238E27FC236}">
+                <a16:creationId xmlns:a16="http://schemas.microsoft.com/office/drawing/2014/main" id="{6337998B-3737-4D43-973D-24B118D723A2}"/>
+              </a:ext>
+            </a:extLst>
+          </p:cNvPr>
+          <p:cNvSpPr>
+            <a:spLocks noGrp="1"/>
+          </p:cNvSpPr>
+          <p:nvPr>
+            <p:ph idx="1"/>
+          </p:nvPr>
+        </p:nvSpPr>
+        <p:spPr>
+          <a:xfrm>
+            <a:off x="1103311" y="2183907"/>
+            <a:ext cx="9034987" cy="3986074"/>
+          </a:xfrm>
+        </p:spPr>
+        <p:txBody>
+          <a:bodyPr/>
+          <a:lstStyle/>
+          <a:p>
+            <a:r>
+              <a:rPr lang="en-US">
+                <a:latin typeface="Arial" panose="020B0604020202020204" pitchFamily="34" charset="0"/>
+                <a:cs typeface="Arial" panose="020B0604020202020204" pitchFamily="34" charset="0"/>
+              </a:rPr>
+              <a:t>Những đối tượng thuộc lớp là những đối tượng đại diện cho nội dung phản hồi sẽ trả về cho JavaEE Container để JavaEE Container tạo phản hồi HTTP phản hồi về phía trình duyệt web.</a:t>
+            </a:r>
+          </a:p>
+          <a:p>
+            <a:r>
+              <a:rPr lang="en-US">
+                <a:latin typeface="Arial" panose="020B0604020202020204" pitchFamily="34" charset="0"/>
+                <a:cs typeface="Arial" panose="020B0604020202020204" pitchFamily="34" charset="0"/>
+              </a:rPr>
+              <a:t>Những công việc chính của HttpServletResponse:</a:t>
+            </a:r>
+          </a:p>
+          <a:p>
+            <a:pPr lvl="1"/>
+            <a:r>
+              <a:rPr lang="en-US">
+                <a:latin typeface="Arial" panose="020B0604020202020204" pitchFamily="34" charset="0"/>
+                <a:cs typeface="Arial" panose="020B0604020202020204" pitchFamily="34" charset="0"/>
+              </a:rPr>
+              <a:t>Chuyển hướng yêu cầu HTTP: Chuyển hướng xử lý yêu cầu HTTP về một địa chỉ khác. (Ví dụ: Chuyển hướng từ /login =&gt; /home)</a:t>
+            </a:r>
+          </a:p>
+          <a:p>
+            <a:pPr lvl="1"/>
+            <a:r>
+              <a:rPr lang="en-US">
+                <a:latin typeface="Arial" panose="020B0604020202020204" pitchFamily="34" charset="0"/>
+                <a:cs typeface="Arial" panose="020B0604020202020204" pitchFamily="34" charset="0"/>
+              </a:rPr>
+              <a:t>Tạo nội dung phản hồi: Tạo nội dung phản hồi để JavaEE Container tạo phản hồi HTTP và phản hồi về phía trình duyệt web.</a:t>
+            </a:r>
+          </a:p>
+        </p:txBody>
+      </p:sp>
+    </p:spTree>
+    <p:extLst>
+      <p:ext uri="{BB962C8B-B14F-4D97-AF65-F5344CB8AC3E}">
+        <p14:creationId xmlns:p14="http://schemas.microsoft.com/office/powerpoint/2010/main" val="2173641689"/>
+      </p:ext>
+    </p:extLst>
+  </p:cSld>
+  <p:clrMapOvr>
+    <a:masterClrMapping/>
+  </p:clrMapOvr>
+</p:sld>
+</file>
+
+<file path=ppt/slides/slide27.xml><?xml version="1.0" encoding="utf-8"?>
+<p:sld xmlns:a="http://schemas.openxmlformats.org/drawingml/2006/main" xmlns:r="http://schemas.openxmlformats.org/officeDocument/2006/relationships" xmlns:p="http://schemas.openxmlformats.org/presentationml/2006/main">
+  <p:cSld>
+    <p:spTree>
+      <p:nvGrpSpPr>
+        <p:cNvPr id="1" name=""/>
+        <p:cNvGrpSpPr/>
+        <p:nvPr/>
+      </p:nvGrpSpPr>
+      <p:grpSpPr>
+        <a:xfrm>
+          <a:off x="0" y="0"/>
+          <a:ext cx="0" cy="0"/>
+          <a:chOff x="0" y="0"/>
+          <a:chExt cx="0" cy="0"/>
+        </a:xfrm>
+      </p:grpSpPr>
+      <p:sp>
+        <p:nvSpPr>
+          <p:cNvPr id="2" name="Title 1">
+            <a:extLst>
+              <a:ext uri="{FF2B5EF4-FFF2-40B4-BE49-F238E27FC236}">
+                <a16:creationId xmlns:a16="http://schemas.microsoft.com/office/drawing/2014/main" id="{14D7F595-0D8F-4FE6-A3EC-4557A1A457EB}"/>
+              </a:ext>
+            </a:extLst>
+          </p:cNvPr>
+          <p:cNvSpPr>
+            <a:spLocks noGrp="1"/>
+          </p:cNvSpPr>
+          <p:nvPr>
+            <p:ph type="title"/>
+          </p:nvPr>
+        </p:nvSpPr>
+        <p:spPr/>
+        <p:txBody>
+          <a:bodyPr/>
+          <a:lstStyle/>
+          <a:p>
+            <a:r>
+              <a:rPr lang="en-US">
+                <a:latin typeface="Arial" panose="020B0604020202020204" pitchFamily="34" charset="0"/>
+                <a:cs typeface="Arial" panose="020B0604020202020204" pitchFamily="34" charset="0"/>
+              </a:rPr>
+              <a:t>5.5. Lớp HttpServletResponse</a:t>
             </a:r>
           </a:p>
         </p:txBody>
@@ -8478,7 +8615,7 @@
 </p:sld>
 </file>
 
-<file path=ppt/slides/slide27.xml><?xml version="1.0" encoding="utf-8"?>
+<file path=ppt/slides/slide28.xml><?xml version="1.0" encoding="utf-8"?>
 <p:sld xmlns:a="http://schemas.openxmlformats.org/drawingml/2006/main" xmlns:r="http://schemas.openxmlformats.org/officeDocument/2006/relationships" xmlns:p="http://schemas.openxmlformats.org/presentationml/2006/main">
   <p:cSld>
     <p:spTree>
@@ -8521,7 +8658,7 @@
                 <a:latin typeface="Arial" panose="020B0604020202020204" pitchFamily="34" charset="0"/>
                 <a:cs typeface="Arial" panose="020B0604020202020204" pitchFamily="34" charset="0"/>
               </a:rPr>
-              <a:t>4.5. Lớp HttpServletResponse</a:t>
+              <a:t>5.5. Lớp HttpServletResponse</a:t>
             </a:r>
           </a:p>
         </p:txBody>
@@ -8605,7 +8742,7 @@
 </p:sld>
 </file>
 
-<file path=ppt/slides/slide28.xml><?xml version="1.0" encoding="utf-8"?>
+<file path=ppt/slides/slide29.xml><?xml version="1.0" encoding="utf-8"?>
 <p:sld xmlns:a="http://schemas.openxmlformats.org/drawingml/2006/main" xmlns:r="http://schemas.openxmlformats.org/officeDocument/2006/relationships" xmlns:p="http://schemas.openxmlformats.org/presentationml/2006/main">
   <p:cSld>
     <p:spTree>
@@ -8648,7 +8785,7 @@
                 <a:latin typeface="Arial" panose="020B0604020202020204" pitchFamily="34" charset="0"/>
                 <a:cs typeface="Arial" panose="020B0604020202020204" pitchFamily="34" charset="0"/>
               </a:rPr>
-              <a:t>4.5. Lớp HttpServletResponse</a:t>
+              <a:t>5.5. Lớp HttpServletResponse</a:t>
             </a:r>
           </a:p>
         </p:txBody>

</xml_diff>